<commit_message>
Installed bluez on Pi; Edit Environment pptx; message to Chung in \09_Network\01_Bluetooth"
</commit_message>
<xml_diff>
--- a/00_Document/00_development_process/PPT_Environment_R00.pptx
+++ b/00_Document/00_development_process/PPT_Environment_R00.pptx
@@ -15,7 +15,8 @@
     <p:sldId id="264" r:id="rId9"/>
     <p:sldId id="265" r:id="rId10"/>
     <p:sldId id="258" r:id="rId11"/>
-    <p:sldId id="266" r:id="rId12"/>
+    <p:sldId id="268" r:id="rId12"/>
+    <p:sldId id="266" r:id="rId13"/>
   </p:sldIdLst>
   <p:sldSz cx="12192000" cy="6858000"/>
   <p:notesSz cx="6858000" cy="9144000"/>
@@ -253,7 +254,7 @@
           <a:p>
             <a:fld id="{6F71E907-338E-4D9B-B3AA-1A244AA64770}" type="datetimeFigureOut">
               <a:rPr lang="en-US" smtClean="0"/>
-              <a:t>3/15/2017</a:t>
+              <a:t>3/17/2017</a:t>
             </a:fld>
             <a:endParaRPr lang="en-US"/>
           </a:p>
@@ -423,7 +424,7 @@
           <a:p>
             <a:fld id="{6F71E907-338E-4D9B-B3AA-1A244AA64770}" type="datetimeFigureOut">
               <a:rPr lang="en-US" smtClean="0"/>
-              <a:t>3/15/2017</a:t>
+              <a:t>3/17/2017</a:t>
             </a:fld>
             <a:endParaRPr lang="en-US"/>
           </a:p>
@@ -603,7 +604,7 @@
           <a:p>
             <a:fld id="{6F71E907-338E-4D9B-B3AA-1A244AA64770}" type="datetimeFigureOut">
               <a:rPr lang="en-US" smtClean="0"/>
-              <a:t>3/15/2017</a:t>
+              <a:t>3/17/2017</a:t>
             </a:fld>
             <a:endParaRPr lang="en-US"/>
           </a:p>
@@ -773,7 +774,7 @@
           <a:p>
             <a:fld id="{6F71E907-338E-4D9B-B3AA-1A244AA64770}" type="datetimeFigureOut">
               <a:rPr lang="en-US" smtClean="0"/>
-              <a:t>3/15/2017</a:t>
+              <a:t>3/17/2017</a:t>
             </a:fld>
             <a:endParaRPr lang="en-US"/>
           </a:p>
@@ -1019,7 +1020,7 @@
           <a:p>
             <a:fld id="{6F71E907-338E-4D9B-B3AA-1A244AA64770}" type="datetimeFigureOut">
               <a:rPr lang="en-US" smtClean="0"/>
-              <a:t>3/15/2017</a:t>
+              <a:t>3/17/2017</a:t>
             </a:fld>
             <a:endParaRPr lang="en-US"/>
           </a:p>
@@ -1251,7 +1252,7 @@
           <a:p>
             <a:fld id="{6F71E907-338E-4D9B-B3AA-1A244AA64770}" type="datetimeFigureOut">
               <a:rPr lang="en-US" smtClean="0"/>
-              <a:t>3/15/2017</a:t>
+              <a:t>3/17/2017</a:t>
             </a:fld>
             <a:endParaRPr lang="en-US"/>
           </a:p>
@@ -1618,7 +1619,7 @@
           <a:p>
             <a:fld id="{6F71E907-338E-4D9B-B3AA-1A244AA64770}" type="datetimeFigureOut">
               <a:rPr lang="en-US" smtClean="0"/>
-              <a:t>3/15/2017</a:t>
+              <a:t>3/17/2017</a:t>
             </a:fld>
             <a:endParaRPr lang="en-US"/>
           </a:p>
@@ -1736,7 +1737,7 @@
           <a:p>
             <a:fld id="{6F71E907-338E-4D9B-B3AA-1A244AA64770}" type="datetimeFigureOut">
               <a:rPr lang="en-US" smtClean="0"/>
-              <a:t>3/15/2017</a:t>
+              <a:t>3/17/2017</a:t>
             </a:fld>
             <a:endParaRPr lang="en-US"/>
           </a:p>
@@ -1831,7 +1832,7 @@
           <a:p>
             <a:fld id="{6F71E907-338E-4D9B-B3AA-1A244AA64770}" type="datetimeFigureOut">
               <a:rPr lang="en-US" smtClean="0"/>
-              <a:t>3/15/2017</a:t>
+              <a:t>3/17/2017</a:t>
             </a:fld>
             <a:endParaRPr lang="en-US"/>
           </a:p>
@@ -2108,7 +2109,7 @@
           <a:p>
             <a:fld id="{6F71E907-338E-4D9B-B3AA-1A244AA64770}" type="datetimeFigureOut">
               <a:rPr lang="en-US" smtClean="0"/>
-              <a:t>3/15/2017</a:t>
+              <a:t>3/17/2017</a:t>
             </a:fld>
             <a:endParaRPr lang="en-US"/>
           </a:p>
@@ -2361,7 +2362,7 @@
           <a:p>
             <a:fld id="{6F71E907-338E-4D9B-B3AA-1A244AA64770}" type="datetimeFigureOut">
               <a:rPr lang="en-US" smtClean="0"/>
-              <a:t>3/15/2017</a:t>
+              <a:t>3/17/2017</a:t>
             </a:fld>
             <a:endParaRPr lang="en-US"/>
           </a:p>
@@ -2574,7 +2575,7 @@
           <a:p>
             <a:fld id="{6F71E907-338E-4D9B-B3AA-1A244AA64770}" type="datetimeFigureOut">
               <a:rPr lang="en-US" smtClean="0"/>
-              <a:t>3/15/2017</a:t>
+              <a:t>3/17/2017</a:t>
             </a:fld>
             <a:endParaRPr lang="en-US"/>
           </a:p>
@@ -3213,6 +3214,98 @@
             <a:spLocks noGrp="1"/>
           </p:cNvSpPr>
           <p:nvPr>
+            <p:ph type="title"/>
+          </p:nvPr>
+        </p:nvSpPr>
+        <p:spPr/>
+        <p:txBody>
+          <a:bodyPr/>
+          <a:lstStyle/>
+          <a:p>
+            <a:r>
+              <a:rPr lang="en-US" dirty="0" smtClean="0"/>
+              <a:t>Bluetooth</a:t>
+            </a:r>
+            <a:endParaRPr lang="en-US" dirty="0"/>
+          </a:p>
+        </p:txBody>
+      </p:sp>
+      <p:sp>
+        <p:nvSpPr>
+          <p:cNvPr id="3" name="Content Placeholder 2"/>
+          <p:cNvSpPr>
+            <a:spLocks noGrp="1"/>
+          </p:cNvSpPr>
+          <p:nvPr>
+            <p:ph idx="1"/>
+          </p:nvPr>
+        </p:nvSpPr>
+        <p:spPr/>
+        <p:txBody>
+          <a:bodyPr/>
+          <a:lstStyle/>
+          <a:p>
+            <a:r>
+              <a:rPr lang="en-US" dirty="0" smtClean="0"/>
+              <a:t>Installed </a:t>
+            </a:r>
+            <a:r>
+              <a:rPr lang="en-US" dirty="0" smtClean="0">
+                <a:hlinkClick r:id="rId2"/>
+              </a:rPr>
+              <a:t>Bluez</a:t>
+            </a:r>
+            <a:r>
+              <a:rPr lang="en-US" dirty="0" smtClean="0"/>
+              <a:t> (requested by Chung)</a:t>
+            </a:r>
+          </a:p>
+          <a:p>
+            <a:r>
+              <a:rPr lang="en-US" dirty="0" smtClean="0"/>
+              <a:t>It’s a Bluetooth kernel module</a:t>
+            </a:r>
+            <a:endParaRPr lang="en-US" dirty="0"/>
+          </a:p>
+        </p:txBody>
+      </p:sp>
+    </p:spTree>
+    <p:extLst>
+      <p:ext uri="{BB962C8B-B14F-4D97-AF65-F5344CB8AC3E}">
+        <p14:creationId xmlns:p14="http://schemas.microsoft.com/office/powerpoint/2010/main" val="2211392380"/>
+      </p:ext>
+    </p:extLst>
+  </p:cSld>
+  <p:clrMapOvr>
+    <a:masterClrMapping/>
+  </p:clrMapOvr>
+</p:sld>
+</file>
+
+<file path=ppt/slides/slide12.xml><?xml version="1.0" encoding="utf-8"?>
+<p:sld xmlns:a="http://schemas.openxmlformats.org/drawingml/2006/main" xmlns:r="http://schemas.openxmlformats.org/officeDocument/2006/relationships" xmlns:p="http://schemas.openxmlformats.org/presentationml/2006/main">
+  <p:cSld>
+    <p:spTree>
+      <p:nvGrpSpPr>
+        <p:cNvPr id="1" name=""/>
+        <p:cNvGrpSpPr/>
+        <p:nvPr/>
+      </p:nvGrpSpPr>
+      <p:grpSpPr>
+        <a:xfrm>
+          <a:off x="0" y="0"/>
+          <a:ext cx="0" cy="0"/>
+          <a:chOff x="0" y="0"/>
+          <a:chExt cx="0" cy="0"/>
+        </a:xfrm>
+      </p:grpSpPr>
+      <p:sp>
+        <p:nvSpPr>
+          <p:cNvPr id="2" name="Title 1"/>
+          <p:cNvSpPr>
+            <a:spLocks noGrp="1"/>
+          </p:cNvSpPr>
+          <p:nvPr>
             <p:ph type="ctrTitle"/>
           </p:nvPr>
         </p:nvSpPr>
@@ -3246,13 +3339,8 @@
           <a:p>
             <a:r>
               <a:rPr lang="en-US" dirty="0" smtClean="0"/>
-              <a:t>Feel free </a:t>
-            </a:r>
-            <a:r>
-              <a:rPr lang="en-US" dirty="0" smtClean="0"/>
-              <a:t>to suggest any edit</a:t>
-            </a:r>
-            <a:endParaRPr lang="en-US" dirty="0" smtClean="0"/>
+              <a:t>Feel free to suggest any edit</a:t>
+            </a:r>
           </a:p>
         </p:txBody>
       </p:sp>
@@ -4051,15 +4139,7 @@
             <a:pPr lvl="2"/>
             <a:r>
               <a:rPr lang="en-US" dirty="0" smtClean="0"/>
-              <a:t>Commit </a:t>
-            </a:r>
-            <a:r>
-              <a:rPr lang="en-US" dirty="0" smtClean="0"/>
-              <a:t>everything to </a:t>
-            </a:r>
-            <a:r>
-              <a:rPr lang="en-US" dirty="0" smtClean="0"/>
-              <a:t>this repo</a:t>
+              <a:t>Commit everything to this repo</a:t>
             </a:r>
           </a:p>
           <a:p>
@@ -4359,6 +4439,19 @@
                 <a:hlinkClick r:id="rId2"/>
               </a:rPr>
               <a:t>This</a:t>
+            </a:r>
+            <a:endParaRPr lang="en-US" dirty="0" smtClean="0"/>
+          </a:p>
+          <a:p>
+            <a:r>
+              <a:rPr lang="en-US" dirty="0" smtClean="0"/>
+              <a:t>Or send code to someone using windows PC and build from windows </a:t>
+            </a:r>
+            <a:r>
+              <a:rPr lang="en-US" dirty="0" smtClean="0">
+                <a:sym typeface="Wingdings" panose="05000000000000000000" pitchFamily="2" charset="2"/>
+              </a:rPr>
+              <a:t></a:t>
             </a:r>
             <a:endParaRPr lang="en-US" dirty="0"/>
           </a:p>

</xml_diff>